<commit_message>
update new date for second group meeting
</commit_message>
<xml_diff>
--- a/lectures/7/Developing the sampling plan.pptx
+++ b/lectures/7/Developing the sampling plan.pptx
@@ -6075,7 +6075,7 @@
           <a:p>
             <a:fld id="{73B2889B-A0AC-4482-8592-5C96F2309420}" type="datetimeFigureOut">
               <a:rPr lang="en-US" smtClean="0"/>
-              <a:t>10/4/2021</a:t>
+              <a:t>1/19/2022</a:t>
             </a:fld>
             <a:endParaRPr lang="en-US"/>
           </a:p>
@@ -6252,7 +6252,7 @@
           <a:p>
             <a:fld id="{830EB223-FFC0-462A-A3B8-EAA7CE0F8CBD}" type="datetimeFigureOut">
               <a:rPr lang="en-US" smtClean="0"/>
-              <a:t>10/4/2021</a:t>
+              <a:t>1/19/2022</a:t>
             </a:fld>
             <a:endParaRPr lang="en-US" dirty="0"/>
           </a:p>
@@ -9232,7 +9232,7 @@
           <a:p>
             <a:fld id="{DECF21A4-E71B-4D3A-AF45-E989C23A7BB1}" type="datetimeFigureOut">
               <a:rPr lang="en-US" smtClean="0"/>
-              <a:t>10/4/2021</a:t>
+              <a:t>1/19/2022</a:t>
             </a:fld>
             <a:endParaRPr lang="en-US" dirty="0"/>
           </a:p>
@@ -9430,7 +9430,7 @@
           <a:p>
             <a:fld id="{DECF21A4-E71B-4D3A-AF45-E989C23A7BB1}" type="datetimeFigureOut">
               <a:rPr lang="en-US" smtClean="0"/>
-              <a:t>10/4/2021</a:t>
+              <a:t>1/19/2022</a:t>
             </a:fld>
             <a:endParaRPr lang="en-US" dirty="0"/>
           </a:p>
@@ -9638,7 +9638,7 @@
           <a:p>
             <a:fld id="{DECF21A4-E71B-4D3A-AF45-E989C23A7BB1}" type="datetimeFigureOut">
               <a:rPr lang="en-US" smtClean="0"/>
-              <a:t>10/4/2021</a:t>
+              <a:t>1/19/2022</a:t>
             </a:fld>
             <a:endParaRPr lang="en-US" dirty="0"/>
           </a:p>
@@ -9836,7 +9836,7 @@
           <a:p>
             <a:fld id="{DECF21A4-E71B-4D3A-AF45-E989C23A7BB1}" type="datetimeFigureOut">
               <a:rPr lang="en-US" smtClean="0"/>
-              <a:t>10/4/2021</a:t>
+              <a:t>1/19/2022</a:t>
             </a:fld>
             <a:endParaRPr lang="en-US" dirty="0"/>
           </a:p>
@@ -10111,7 +10111,7 @@
           <a:p>
             <a:fld id="{DECF21A4-E71B-4D3A-AF45-E989C23A7BB1}" type="datetimeFigureOut">
               <a:rPr lang="en-US" smtClean="0"/>
-              <a:t>10/4/2021</a:t>
+              <a:t>1/19/2022</a:t>
             </a:fld>
             <a:endParaRPr lang="en-US" dirty="0"/>
           </a:p>
@@ -10376,7 +10376,7 @@
           <a:p>
             <a:fld id="{DECF21A4-E71B-4D3A-AF45-E989C23A7BB1}" type="datetimeFigureOut">
               <a:rPr lang="en-US" smtClean="0"/>
-              <a:t>10/4/2021</a:t>
+              <a:t>1/19/2022</a:t>
             </a:fld>
             <a:endParaRPr lang="en-US" dirty="0"/>
           </a:p>
@@ -10788,7 +10788,7 @@
           <a:p>
             <a:fld id="{DECF21A4-E71B-4D3A-AF45-E989C23A7BB1}" type="datetimeFigureOut">
               <a:rPr lang="en-US" smtClean="0"/>
-              <a:t>10/4/2021</a:t>
+              <a:t>1/19/2022</a:t>
             </a:fld>
             <a:endParaRPr lang="en-US" dirty="0"/>
           </a:p>
@@ -10929,7 +10929,7 @@
           <a:p>
             <a:fld id="{DECF21A4-E71B-4D3A-AF45-E989C23A7BB1}" type="datetimeFigureOut">
               <a:rPr lang="en-US" smtClean="0"/>
-              <a:t>10/4/2021</a:t>
+              <a:t>1/19/2022</a:t>
             </a:fld>
             <a:endParaRPr lang="en-US" dirty="0"/>
           </a:p>
@@ -11042,7 +11042,7 @@
           <a:p>
             <a:fld id="{DECF21A4-E71B-4D3A-AF45-E989C23A7BB1}" type="datetimeFigureOut">
               <a:rPr lang="en-US" smtClean="0"/>
-              <a:t>10/4/2021</a:t>
+              <a:t>1/19/2022</a:t>
             </a:fld>
             <a:endParaRPr lang="en-US" dirty="0"/>
           </a:p>
@@ -11353,7 +11353,7 @@
           <a:p>
             <a:fld id="{DECF21A4-E71B-4D3A-AF45-E989C23A7BB1}" type="datetimeFigureOut">
               <a:rPr lang="en-US" smtClean="0"/>
-              <a:t>10/4/2021</a:t>
+              <a:t>1/19/2022</a:t>
             </a:fld>
             <a:endParaRPr lang="en-US" dirty="0"/>
           </a:p>
@@ -11645,7 +11645,7 @@
           <a:p>
             <a:fld id="{DECF21A4-E71B-4D3A-AF45-E989C23A7BB1}" type="datetimeFigureOut">
               <a:rPr lang="en-US" smtClean="0"/>
-              <a:t>10/4/2021</a:t>
+              <a:t>1/19/2022</a:t>
             </a:fld>
             <a:endParaRPr lang="en-US" dirty="0"/>
           </a:p>
@@ -11886,7 +11886,7 @@
           <a:p>
             <a:fld id="{DECF21A4-E71B-4D3A-AF45-E989C23A7BB1}" type="datetimeFigureOut">
               <a:rPr lang="en-US" smtClean="0"/>
-              <a:t>10/4/2021</a:t>
+              <a:t>1/19/2022</a:t>
             </a:fld>
             <a:endParaRPr lang="en-US" dirty="0"/>
           </a:p>
@@ -12287,7 +12287,7 @@
 </file>
 
 <file path=ppt/slides/slide1.xml><?xml version="1.0" encoding="utf-8"?>
-<p:sld xmlns:a="http://schemas.openxmlformats.org/drawingml/2006/main" xmlns:r="http://schemas.openxmlformats.org/officeDocument/2006/relationships" xmlns:p="http://schemas.openxmlformats.org/presentationml/2006/main">
+<p:sld xmlns:a="http://schemas.openxmlformats.org/drawingml/2006/main" xmlns:r="http://schemas.openxmlformats.org/officeDocument/2006/relationships" xmlns:p="http://schemas.openxmlformats.org/presentationml/2006/main" show="0">
   <p:cSld>
     <p:bg>
       <p:bgPr>
@@ -21378,8 +21378,8 @@
           </a:p>
         </p:txBody>
       </p:sp>
-      <mc:AlternateContent xmlns:mc="http://schemas.openxmlformats.org/markup-compatibility/2006">
-        <mc:Choice xmlns:a14="http://schemas.microsoft.com/office/drawing/2010/main" Requires="a14">
+      <mc:AlternateContent xmlns:mc="http://schemas.openxmlformats.org/markup-compatibility/2006" xmlns:a14="http://schemas.microsoft.com/office/drawing/2010/main">
+        <mc:Choice Requires="a14">
           <p:sp>
             <p:nvSpPr>
               <p:cNvPr id="3" name="Content Placeholder 2">
@@ -21541,7 +21541,7 @@
             </p:txBody>
           </p:sp>
         </mc:Choice>
-        <mc:Fallback>
+        <mc:Fallback xmlns="">
           <p:sp>
             <p:nvSpPr>
               <p:cNvPr id="3" name="Content Placeholder 2">
@@ -36040,20 +36040,20 @@
 </file>
 
 <file path=customXml/item2.xml><?xml version="1.0" encoding="utf-8"?>
-<p:properties xmlns:p="http://schemas.microsoft.com/office/2006/metadata/properties" xmlns:xsi="http://www.w3.org/2001/XMLSchema-instance" xmlns:pc="http://schemas.microsoft.com/office/infopath/2007/PartnerControls">
-  <documentManagement>
-    <MediaServiceKeyPoints xmlns="71af3243-3dd4-4a8d-8c0d-dd76da1f02a5" xsi:nil="true"/>
-  </documentManagement>
-</p:properties>
-</file>
-
-<file path=customXml/item3.xml><?xml version="1.0" encoding="utf-8"?>
 <?mso-contentType ?>
 <FormTemplates xmlns="http://schemas.microsoft.com/sharepoint/v3/contenttype/forms">
   <Display>DocumentLibraryForm</Display>
   <Edit>DocumentLibraryForm</Edit>
   <New>DocumentLibraryForm</New>
 </FormTemplates>
+</file>
+
+<file path=customXml/item3.xml><?xml version="1.0" encoding="utf-8"?>
+<p:properties xmlns:p="http://schemas.microsoft.com/office/2006/metadata/properties" xmlns:xsi="http://www.w3.org/2001/XMLSchema-instance" xmlns:pc="http://schemas.microsoft.com/office/infopath/2007/PartnerControls">
+  <documentManagement>
+    <MediaServiceKeyPoints xmlns="71af3243-3dd4-4a8d-8c0d-dd76da1f02a5" xsi:nil="true"/>
+  </documentManagement>
+</p:properties>
 </file>
 
 <file path=customXml/itemProps1.xml><?xml version="1.0" encoding="utf-8"?>
@@ -36076,6 +36076,14 @@
 </file>
 
 <file path=customXml/itemProps2.xml><?xml version="1.0" encoding="utf-8"?>
+<ds:datastoreItem xmlns:ds="http://schemas.openxmlformats.org/officeDocument/2006/customXml" ds:itemID="{5CA875DA-F9FD-4F83-A049-3B1027B542DE}">
+  <ds:schemaRefs>
+    <ds:schemaRef ds:uri="http://schemas.microsoft.com/sharepoint/v3/contenttype/forms"/>
+  </ds:schemaRefs>
+</ds:datastoreItem>
+</file>
+
+<file path=customXml/itemProps3.xml><?xml version="1.0" encoding="utf-8"?>
 <ds:datastoreItem xmlns:ds="http://schemas.openxmlformats.org/officeDocument/2006/customXml" ds:itemID="{03C7D9E6-B0D9-433E-BD46-EB60F64F4DA8}">
   <ds:schemaRefs>
     <ds:schemaRef ds:uri="http://schemas.microsoft.com/office/2006/metadata/properties"/>
@@ -36083,12 +36091,4 @@
     <ds:schemaRef ds:uri="71af3243-3dd4-4a8d-8c0d-dd76da1f02a5"/>
   </ds:schemaRefs>
 </ds:datastoreItem>
-</file>
-
-<file path=customXml/itemProps3.xml><?xml version="1.0" encoding="utf-8"?>
-<ds:datastoreItem xmlns:ds="http://schemas.openxmlformats.org/officeDocument/2006/customXml" ds:itemID="{5CA875DA-F9FD-4F83-A049-3B1027B542DE}">
-  <ds:schemaRefs>
-    <ds:schemaRef ds:uri="http://schemas.microsoft.com/sharepoint/v3/contenttype/forms"/>
-  </ds:schemaRefs>
-</ds:datastoreItem>
 </file>
</xml_diff>